<commit_message>
formatting multi mapping code better, adding and updating some screenshots in powerpoint
</commit_message>
<xml_diff>
--- a/Dapper.pptx
+++ b/Dapper.pptx
@@ -5,7 +5,7 @@
     <p:sldMasterId id="2147483648" r:id="rId1"/>
   </p:sldMasterIdLst>
   <p:notesMasterIdLst>
-    <p:notesMasterId r:id="rId47"/>
+    <p:notesMasterId r:id="rId51"/>
   </p:notesMasterIdLst>
   <p:sldIdLst>
     <p:sldId id="256" r:id="rId2"/>
@@ -40,19 +40,23 @@
     <p:sldId id="293" r:id="rId31"/>
     <p:sldId id="294" r:id="rId32"/>
     <p:sldId id="296" r:id="rId33"/>
-    <p:sldId id="299" r:id="rId34"/>
-    <p:sldId id="301" r:id="rId35"/>
-    <p:sldId id="302" r:id="rId36"/>
-    <p:sldId id="303" r:id="rId37"/>
-    <p:sldId id="304" r:id="rId38"/>
-    <p:sldId id="305" r:id="rId39"/>
-    <p:sldId id="306" r:id="rId40"/>
-    <p:sldId id="269" r:id="rId41"/>
-    <p:sldId id="297" r:id="rId42"/>
-    <p:sldId id="298" r:id="rId43"/>
-    <p:sldId id="289" r:id="rId44"/>
-    <p:sldId id="290" r:id="rId45"/>
-    <p:sldId id="271" r:id="rId46"/>
+    <p:sldId id="307" r:id="rId34"/>
+    <p:sldId id="310" r:id="rId35"/>
+    <p:sldId id="308" r:id="rId36"/>
+    <p:sldId id="309" r:id="rId37"/>
+    <p:sldId id="299" r:id="rId38"/>
+    <p:sldId id="301" r:id="rId39"/>
+    <p:sldId id="302" r:id="rId40"/>
+    <p:sldId id="303" r:id="rId41"/>
+    <p:sldId id="304" r:id="rId42"/>
+    <p:sldId id="305" r:id="rId43"/>
+    <p:sldId id="306" r:id="rId44"/>
+    <p:sldId id="269" r:id="rId45"/>
+    <p:sldId id="297" r:id="rId46"/>
+    <p:sldId id="298" r:id="rId47"/>
+    <p:sldId id="289" r:id="rId48"/>
+    <p:sldId id="290" r:id="rId49"/>
+    <p:sldId id="271" r:id="rId50"/>
   </p:sldIdLst>
   <p:sldSz cx="12192000" cy="6858000"/>
   <p:notesSz cx="6858000" cy="9144000"/>
@@ -241,7 +245,7 @@
           <a:p>
             <a:fld id="{BBE389BB-A4D6-40BE-A749-B3B365FBDA14}" type="datetimeFigureOut">
               <a:rPr lang="en-US" smtClean="0"/>
-              <a:t>4/4/2015</a:t>
+              <a:t>4/24/2015</a:t>
             </a:fld>
             <a:endParaRPr lang="en-US"/>
           </a:p>
@@ -768,15 +772,7 @@
             </a:r>
             <a:r>
               <a:rPr lang="en-US" baseline="0" dirty="0" smtClean="0"/>
-              <a:t> test creates a </a:t>
-            </a:r>
-            <a:r>
-              <a:rPr lang="en-US" baseline="0" dirty="0" smtClean="0"/>
-              <a:t>brand </a:t>
-            </a:r>
-            <a:r>
-              <a:rPr lang="en-US" baseline="0" dirty="0" smtClean="0"/>
-              <a:t>new SQLite database in memory</a:t>
+              <a:t> test creates a brand new SQLite database in memory</a:t>
             </a:r>
             <a:endParaRPr lang="en-US" dirty="0"/>
           </a:p>
@@ -2347,11 +2343,7 @@
             </a:r>
             <a:r>
               <a:rPr lang="en-US" baseline="0" dirty="0" smtClean="0"/>
-              <a:t>objects that are related to another object</a:t>
-            </a:r>
-            <a:r>
-              <a:rPr lang="en-US" baseline="0" dirty="0" smtClean="0"/>
-              <a:t>.</a:t>
+              <a:t>objects that are related to another object.</a:t>
             </a:r>
           </a:p>
         </p:txBody>
@@ -2963,7 +2955,7 @@
           <a:bodyPr/>
           <a:lstStyle/>
           <a:p>
-            <a:endParaRPr lang="en-US" baseline="0" dirty="0" smtClean="0"/>
+            <a:endParaRPr lang="en-US" dirty="0"/>
           </a:p>
         </p:txBody>
       </p:sp>
@@ -2993,7 +2985,7 @@
     </p:spTree>
     <p:extLst>
       <p:ext uri="{BB962C8B-B14F-4D97-AF65-F5344CB8AC3E}">
-        <p14:creationId xmlns:p14="http://schemas.microsoft.com/office/powerpoint/2010/main" val="1237497590"/>
+        <p14:creationId xmlns:p14="http://schemas.microsoft.com/office/powerpoint/2010/main" val="2777249153"/>
       </p:ext>
     </p:extLst>
   </p:cSld>
@@ -3049,40 +3041,28 @@
           <a:p>
             <a:r>
               <a:rPr lang="en-US" dirty="0" smtClean="0"/>
-              <a:t>Note</a:t>
+              <a:t>This is a lot to take in, but it’s all setup code. I’m creating</a:t>
             </a:r>
             <a:r>
               <a:rPr lang="en-US" baseline="0" dirty="0" smtClean="0"/>
-              <a:t> that this COULD be modeled the other way: </a:t>
+              <a:t> three tables: </a:t>
             </a:r>
             <a:r>
               <a:rPr lang="en-US" baseline="0" dirty="0" err="1" smtClean="0"/>
-              <a:t>CrewMember</a:t>
+              <a:t>ComicBookCompanies</a:t>
             </a:r>
             <a:r>
               <a:rPr lang="en-US" baseline="0" dirty="0" smtClean="0"/>
-              <a:t> would have a Starship parent.</a:t>
+              <a:t>, Heroes, and Sidekicks.</a:t>
             </a:r>
           </a:p>
           <a:p>
             <a:r>
               <a:rPr lang="en-US" baseline="0" dirty="0" smtClean="0"/>
-              <a:t>But maybe that doesn’t fit your model: maybe crewmembers can be assigned to multiple starships, whatever.</a:t>
-            </a:r>
-          </a:p>
-          <a:p>
-            <a:r>
-              <a:rPr lang="en-US" baseline="0" dirty="0" smtClean="0"/>
-              <a:t>How can Dapper populate that </a:t>
-            </a:r>
-            <a:r>
-              <a:rPr lang="en-US" baseline="0" dirty="0" err="1" smtClean="0"/>
-              <a:t>CrewMembers</a:t>
-            </a:r>
-            <a:r>
-              <a:rPr lang="en-US" baseline="0" dirty="0" smtClean="0"/>
-              <a:t> field?</a:t>
-            </a:r>
+              <a:t>Then I’m inserting related data into each. D.C., Batman, Robin.</a:t>
+            </a:r>
+          </a:p>
+          <a:p>
             <a:endParaRPr lang="en-US" dirty="0"/>
           </a:p>
         </p:txBody>
@@ -3113,7 +3093,7 @@
     </p:spTree>
     <p:extLst>
       <p:ext uri="{BB962C8B-B14F-4D97-AF65-F5344CB8AC3E}">
-        <p14:creationId xmlns:p14="http://schemas.microsoft.com/office/powerpoint/2010/main" val="123999999"/>
+        <p14:creationId xmlns:p14="http://schemas.microsoft.com/office/powerpoint/2010/main" val="1795281730"/>
       </p:ext>
     </p:extLst>
   </p:cSld>
@@ -3169,26 +3149,39 @@
           <a:p>
             <a:r>
               <a:rPr lang="en-US" dirty="0" smtClean="0"/>
-              <a:t>Well the answer is “yeah you </a:t>
-            </a:r>
-            <a:r>
-              <a:rPr lang="en-US" dirty="0" err="1" smtClean="0"/>
-              <a:t>kinda</a:t>
-            </a:r>
-            <a:r>
-              <a:rPr lang="en-US" dirty="0" smtClean="0"/>
-              <a:t> can,</a:t>
+              <a:t>Now, I want to select the data back out.</a:t>
+            </a:r>
+          </a:p>
+          <a:p>
+            <a:r>
+              <a:rPr lang="en-US" dirty="0" smtClean="0"/>
+              <a:t>I join all</a:t>
             </a:r>
             <a:r>
               <a:rPr lang="en-US" baseline="0" dirty="0" smtClean="0"/>
-              <a:t> but you probably won’t like it”</a:t>
+              <a:t> three tables.</a:t>
             </a:r>
           </a:p>
           <a:p>
             <a:r>
               <a:rPr lang="en-US" baseline="0" dirty="0" smtClean="0"/>
-              <a:t>And if you need to do this a lot, then you should either a) write some convenience methods or classes to do this for you, or b) consider using a normal OR/M</a:t>
-            </a:r>
+              <a:t>I’m asking dapper to split the data up into 3 objects.</a:t>
+            </a:r>
+          </a:p>
+          <a:p>
+            <a:r>
+              <a:rPr lang="en-US" baseline="0" dirty="0" smtClean="0"/>
+              <a:t>For each row, it will give me a Sidekick.</a:t>
+            </a:r>
+          </a:p>
+          <a:p>
+            <a:r>
+              <a:rPr lang="en-US" baseline="0" dirty="0" smtClean="0"/>
+              <a:t>For each sidekick, I specify a lambda to associate the other objects.</a:t>
+            </a:r>
+          </a:p>
+          <a:p>
+            <a:endParaRPr lang="en-US" dirty="0"/>
           </a:p>
         </p:txBody>
       </p:sp>
@@ -3218,7 +3211,7 @@
     </p:spTree>
     <p:extLst>
       <p:ext uri="{BB962C8B-B14F-4D97-AF65-F5344CB8AC3E}">
-        <p14:creationId xmlns:p14="http://schemas.microsoft.com/office/powerpoint/2010/main" val="4243072246"/>
+        <p14:creationId xmlns:p14="http://schemas.microsoft.com/office/powerpoint/2010/main" val="3424115734"/>
       </p:ext>
     </p:extLst>
   </p:cSld>
@@ -3274,17 +3267,7 @@
           <a:p>
             <a:r>
               <a:rPr lang="en-US" dirty="0" smtClean="0"/>
-              <a:t>Here’s the straightforward stuff. Create</a:t>
-            </a:r>
-            <a:r>
-              <a:rPr lang="en-US" baseline="0" dirty="0" smtClean="0"/>
-              <a:t> the tables and putting stuff in them.</a:t>
-            </a:r>
-          </a:p>
-          <a:p>
-            <a:r>
-              <a:rPr lang="en-US" baseline="0" dirty="0" smtClean="0"/>
-              <a:t>I’m creating one starship enterprise, with Kirk and Spock as crewmembers.</a:t>
+              <a:t>Notice that I used different ID names</a:t>
             </a:r>
             <a:endParaRPr lang="en-US" dirty="0"/>
           </a:p>
@@ -3316,7 +3299,7 @@
     </p:spTree>
     <p:extLst>
       <p:ext uri="{BB962C8B-B14F-4D97-AF65-F5344CB8AC3E}">
-        <p14:creationId xmlns:p14="http://schemas.microsoft.com/office/powerpoint/2010/main" val="1931639315"/>
+        <p14:creationId xmlns:p14="http://schemas.microsoft.com/office/powerpoint/2010/main" val="2950142243"/>
       </p:ext>
     </p:extLst>
   </p:cSld>
@@ -3370,77 +3353,7 @@
           <a:bodyPr/>
           <a:lstStyle/>
           <a:p>
-            <a:r>
-              <a:rPr lang="en-US" dirty="0" smtClean="0"/>
-              <a:t>There’s the query at the top. As before, this will be a </a:t>
-            </a:r>
-            <a:r>
-              <a:rPr lang="en-US" dirty="0" err="1" smtClean="0"/>
-              <a:t>multimap</a:t>
-            </a:r>
-            <a:r>
-              <a:rPr lang="en-US" dirty="0" smtClean="0"/>
-              <a:t> query, so dapper will split on “ID” by convention.</a:t>
-            </a:r>
-          </a:p>
-          <a:p>
-            <a:endParaRPr lang="en-US" dirty="0" smtClean="0"/>
-          </a:p>
-          <a:p>
-            <a:r>
-              <a:rPr lang="en-US" dirty="0" smtClean="0"/>
-              <a:t>Keep in mind that dapper will return one record PER ROW. So in this case, Dapper would attempt</a:t>
-            </a:r>
-            <a:r>
-              <a:rPr lang="en-US" baseline="0" dirty="0" smtClean="0"/>
-              <a:t> to return two records, but really only want one starship record with TWO crewmembers.</a:t>
-            </a:r>
-            <a:endParaRPr lang="en-US" dirty="0" smtClean="0"/>
-          </a:p>
-          <a:p>
-            <a:endParaRPr lang="en-US" dirty="0" smtClean="0"/>
-          </a:p>
-          <a:p>
-            <a:r>
-              <a:rPr lang="en-US" dirty="0" smtClean="0"/>
-              <a:t>So I have to take some extra steps</a:t>
-            </a:r>
-            <a:r>
-              <a:rPr lang="en-US" baseline="0" dirty="0" smtClean="0"/>
-              <a:t> to get what I want. I’m interested in the FIRST starship only, but EVERY crewmember.</a:t>
-            </a:r>
-          </a:p>
-          <a:p>
-            <a:r>
-              <a:rPr lang="en-US" baseline="0" dirty="0" smtClean="0"/>
-              <a:t>I create a lookup to hold a list of Starships.</a:t>
-            </a:r>
-          </a:p>
-          <a:p>
             <a:endParaRPr lang="en-US" baseline="0" dirty="0" smtClean="0"/>
-          </a:p>
-          <a:p>
-            <a:r>
-              <a:rPr lang="en-US" baseline="0" dirty="0" smtClean="0"/>
-              <a:t>So then each time this dapper </a:t>
-            </a:r>
-            <a:r>
-              <a:rPr lang="en-US" baseline="0" dirty="0" err="1" smtClean="0"/>
-              <a:t>multimap</a:t>
-            </a:r>
-            <a:r>
-              <a:rPr lang="en-US" baseline="0" dirty="0" smtClean="0"/>
-              <a:t> method runs, I have to lookup to see if I’ve already got that starship, see if its crewmember collection has been instantiated, and then add a crewmember to that collection.</a:t>
-            </a:r>
-          </a:p>
-          <a:p>
-            <a:endParaRPr lang="en-US" baseline="0" dirty="0" smtClean="0"/>
-          </a:p>
-          <a:p>
-            <a:r>
-              <a:rPr lang="en-US" baseline="0" dirty="0" smtClean="0"/>
-              <a:t>There are other approaches you can take, I’m sure you could write a helper for this, but the bottom line is that it’s extra work.</a:t>
-            </a:r>
           </a:p>
         </p:txBody>
       </p:sp>
@@ -3470,7 +3383,7 @@
     </p:spTree>
     <p:extLst>
       <p:ext uri="{BB962C8B-B14F-4D97-AF65-F5344CB8AC3E}">
-        <p14:creationId xmlns:p14="http://schemas.microsoft.com/office/powerpoint/2010/main" val="57950962"/>
+        <p14:creationId xmlns:p14="http://schemas.microsoft.com/office/powerpoint/2010/main" val="1237497590"/>
       </p:ext>
     </p:extLst>
   </p:cSld>
@@ -3524,6 +3437,42 @@
           <a:bodyPr/>
           <a:lstStyle/>
           <a:p>
+            <a:r>
+              <a:rPr lang="en-US" dirty="0" smtClean="0"/>
+              <a:t>Note</a:t>
+            </a:r>
+            <a:r>
+              <a:rPr lang="en-US" baseline="0" dirty="0" smtClean="0"/>
+              <a:t> that this COULD be modeled the other way: </a:t>
+            </a:r>
+            <a:r>
+              <a:rPr lang="en-US" baseline="0" dirty="0" err="1" smtClean="0"/>
+              <a:t>CrewMember</a:t>
+            </a:r>
+            <a:r>
+              <a:rPr lang="en-US" baseline="0" dirty="0" smtClean="0"/>
+              <a:t> would have a Starship parent.</a:t>
+            </a:r>
+          </a:p>
+          <a:p>
+            <a:r>
+              <a:rPr lang="en-US" baseline="0" dirty="0" smtClean="0"/>
+              <a:t>But maybe that doesn’t fit your model: maybe crewmembers can be assigned to multiple starships, whatever.</a:t>
+            </a:r>
+          </a:p>
+          <a:p>
+            <a:r>
+              <a:rPr lang="en-US" baseline="0" dirty="0" smtClean="0"/>
+              <a:t>How can Dapper populate that </a:t>
+            </a:r>
+            <a:r>
+              <a:rPr lang="en-US" baseline="0" dirty="0" err="1" smtClean="0"/>
+              <a:t>CrewMembers</a:t>
+            </a:r>
+            <a:r>
+              <a:rPr lang="en-US" baseline="0" dirty="0" smtClean="0"/>
+              <a:t> field?</a:t>
+            </a:r>
             <a:endParaRPr lang="en-US" dirty="0"/>
           </a:p>
         </p:txBody>
@@ -3545,7 +3494,7 @@
           <a:p>
             <a:fld id="{E965A807-E819-4112-A5DE-316C1A791510}" type="slidenum">
               <a:rPr lang="en-US" smtClean="0"/>
-              <a:t>40</a:t>
+              <a:t>39</a:t>
             </a:fld>
             <a:endParaRPr lang="en-US"/>
           </a:p>
@@ -3554,7 +3503,7 @@
     </p:spTree>
     <p:extLst>
       <p:ext uri="{BB962C8B-B14F-4D97-AF65-F5344CB8AC3E}">
-        <p14:creationId xmlns:p14="http://schemas.microsoft.com/office/powerpoint/2010/main" val="3384602555"/>
+        <p14:creationId xmlns:p14="http://schemas.microsoft.com/office/powerpoint/2010/main" val="123999999"/>
       </p:ext>
     </p:extLst>
   </p:cSld>
@@ -3610,16 +3559,26 @@
           <a:p>
             <a:r>
               <a:rPr lang="en-US" dirty="0" smtClean="0"/>
-              <a:t>Multi is of type </a:t>
+              <a:t>Well the answer is “yeah you </a:t>
             </a:r>
             <a:r>
               <a:rPr lang="en-US" dirty="0" err="1" smtClean="0"/>
-              <a:t>GridReader</a:t>
-            </a:r>
-            <a:endParaRPr lang="en-US" dirty="0" smtClean="0"/>
-          </a:p>
-          <a:p>
-            <a:endParaRPr lang="en-US" dirty="0"/>
+              <a:t>kinda</a:t>
+            </a:r>
+            <a:r>
+              <a:rPr lang="en-US" dirty="0" smtClean="0"/>
+              <a:t> can,</a:t>
+            </a:r>
+            <a:r>
+              <a:rPr lang="en-US" baseline="0" dirty="0" smtClean="0"/>
+              <a:t> but you probably won’t like it”</a:t>
+            </a:r>
+          </a:p>
+          <a:p>
+            <a:r>
+              <a:rPr lang="en-US" baseline="0" dirty="0" smtClean="0"/>
+              <a:t>And if you need to do this a lot, then you should either a) write some convenience methods or classes to do this for you, or b) consider using a normal OR/M</a:t>
+            </a:r>
           </a:p>
         </p:txBody>
       </p:sp>
@@ -3640,7 +3599,7 @@
           <a:p>
             <a:fld id="{E965A807-E819-4112-A5DE-316C1A791510}" type="slidenum">
               <a:rPr lang="en-US" smtClean="0"/>
-              <a:t>41</a:t>
+              <a:t>40</a:t>
             </a:fld>
             <a:endParaRPr lang="en-US"/>
           </a:p>
@@ -3649,7 +3608,7 @@
     </p:spTree>
     <p:extLst>
       <p:ext uri="{BB962C8B-B14F-4D97-AF65-F5344CB8AC3E}">
-        <p14:creationId xmlns:p14="http://schemas.microsoft.com/office/powerpoint/2010/main" val="1542889149"/>
+        <p14:creationId xmlns:p14="http://schemas.microsoft.com/office/powerpoint/2010/main" val="4243072246"/>
       </p:ext>
     </p:extLst>
   </p:cSld>
@@ -3705,19 +3664,17 @@
           <a:p>
             <a:r>
               <a:rPr lang="en-US" dirty="0" smtClean="0"/>
-              <a:t>My test used Read,</a:t>
+              <a:t>Here’s the straightforward stuff. Create</a:t>
             </a:r>
             <a:r>
               <a:rPr lang="en-US" baseline="0" dirty="0" smtClean="0"/>
-              <a:t> which returns dynamic, but you can use strong typing and </a:t>
-            </a:r>
-            <a:r>
-              <a:rPr lang="en-US" baseline="0" dirty="0" err="1" smtClean="0"/>
-              <a:t>async</a:t>
-            </a:r>
+              <a:t> the tables and putting stuff in them.</a:t>
+            </a:r>
+          </a:p>
+          <a:p>
             <a:r>
               <a:rPr lang="en-US" baseline="0" dirty="0" smtClean="0"/>
-              <a:t> just like everywhere else</a:t>
+              <a:t>I’m creating one starship enterprise, with Kirk and Spock as crewmembers.</a:t>
             </a:r>
             <a:endParaRPr lang="en-US" dirty="0"/>
           </a:p>
@@ -3740,7 +3697,7 @@
           <a:p>
             <a:fld id="{E965A807-E819-4112-A5DE-316C1A791510}" type="slidenum">
               <a:rPr lang="en-US" smtClean="0"/>
-              <a:t>42</a:t>
+              <a:t>41</a:t>
             </a:fld>
             <a:endParaRPr lang="en-US"/>
           </a:p>
@@ -3749,7 +3706,7 @@
     </p:spTree>
     <p:extLst>
       <p:ext uri="{BB962C8B-B14F-4D97-AF65-F5344CB8AC3E}">
-        <p14:creationId xmlns:p14="http://schemas.microsoft.com/office/powerpoint/2010/main" val="4055477433"/>
+        <p14:creationId xmlns:p14="http://schemas.microsoft.com/office/powerpoint/2010/main" val="1931639315"/>
       </p:ext>
     </p:extLst>
   </p:cSld>
@@ -3805,21 +3762,75 @@
           <a:p>
             <a:r>
               <a:rPr lang="en-US" dirty="0" smtClean="0"/>
-              <a:t>There</a:t>
+              <a:t>There’s the query at the top. As before, this will be a </a:t>
+            </a:r>
+            <a:r>
+              <a:rPr lang="en-US" dirty="0" err="1" smtClean="0"/>
+              <a:t>multimap</a:t>
+            </a:r>
+            <a:r>
+              <a:rPr lang="en-US" dirty="0" smtClean="0"/>
+              <a:t> query, so dapper will split on “ID” by convention.</a:t>
+            </a:r>
+          </a:p>
+          <a:p>
+            <a:endParaRPr lang="en-US" dirty="0" smtClean="0"/>
+          </a:p>
+          <a:p>
+            <a:r>
+              <a:rPr lang="en-US" dirty="0" smtClean="0"/>
+              <a:t>Keep in mind that dapper will return one record PER ROW. So in this case, Dapper would attempt</a:t>
             </a:r>
             <a:r>
               <a:rPr lang="en-US" baseline="0" dirty="0" smtClean="0"/>
-              <a:t> are some exceptions dapper will throw, like with the </a:t>
+              <a:t> to return two records, but really only want one starship record with TWO crewmembers.</a:t>
+            </a:r>
+            <a:endParaRPr lang="en-US" dirty="0" smtClean="0"/>
+          </a:p>
+          <a:p>
+            <a:endParaRPr lang="en-US" dirty="0" smtClean="0"/>
+          </a:p>
+          <a:p>
+            <a:r>
+              <a:rPr lang="en-US" dirty="0" smtClean="0"/>
+              <a:t>So I have to take some extra steps</a:t>
+            </a:r>
+            <a:r>
+              <a:rPr lang="en-US" baseline="0" dirty="0" smtClean="0"/>
+              <a:t> to get what I want. I’m interested in the FIRST starship only, but EVERY crewmember.</a:t>
+            </a:r>
+          </a:p>
+          <a:p>
+            <a:r>
+              <a:rPr lang="en-US" baseline="0" dirty="0" smtClean="0"/>
+              <a:t>I create a lookup to hold a list of Starships.</a:t>
+            </a:r>
+          </a:p>
+          <a:p>
+            <a:endParaRPr lang="en-US" baseline="0" dirty="0" smtClean="0"/>
+          </a:p>
+          <a:p>
+            <a:r>
+              <a:rPr lang="en-US" baseline="0" dirty="0" smtClean="0"/>
+              <a:t>So then each time this dapper </a:t>
             </a:r>
             <a:r>
               <a:rPr lang="en-US" baseline="0" dirty="0" err="1" smtClean="0"/>
-              <a:t>multimapping</a:t>
+              <a:t>multimap</a:t>
             </a:r>
             <a:r>
               <a:rPr lang="en-US" baseline="0" dirty="0" smtClean="0"/>
-              <a:t>.</a:t>
-            </a:r>
-            <a:endParaRPr lang="en-US" dirty="0"/>
+              <a:t> method runs, I have to lookup to see if I’ve already got that starship, see if its crewmember collection has been instantiated, and then add a crewmember to that collection.</a:t>
+            </a:r>
+          </a:p>
+          <a:p>
+            <a:endParaRPr lang="en-US" baseline="0" dirty="0" smtClean="0"/>
+          </a:p>
+          <a:p>
+            <a:r>
+              <a:rPr lang="en-US" baseline="0" dirty="0" smtClean="0"/>
+              <a:t>There are other approaches you can take, I’m sure you could write a helper for this, but the bottom line is that it’s extra work.</a:t>
+            </a:r>
           </a:p>
         </p:txBody>
       </p:sp>
@@ -3840,7 +3851,7 @@
           <a:p>
             <a:fld id="{E965A807-E819-4112-A5DE-316C1A791510}" type="slidenum">
               <a:rPr lang="en-US" smtClean="0"/>
-              <a:t>43</a:t>
+              <a:t>42</a:t>
             </a:fld>
             <a:endParaRPr lang="en-US"/>
           </a:p>
@@ -3849,7 +3860,7 @@
     </p:spTree>
     <p:extLst>
       <p:ext uri="{BB962C8B-B14F-4D97-AF65-F5344CB8AC3E}">
-        <p14:creationId xmlns:p14="http://schemas.microsoft.com/office/powerpoint/2010/main" val="1048032343"/>
+        <p14:creationId xmlns:p14="http://schemas.microsoft.com/office/powerpoint/2010/main" val="57950962"/>
       </p:ext>
     </p:extLst>
   </p:cSld>
@@ -3903,32 +3914,6 @@
           <a:bodyPr/>
           <a:lstStyle/>
           <a:p>
-            <a:r>
-              <a:rPr lang="en-US" dirty="0" smtClean="0"/>
-              <a:t>Notice</a:t>
-            </a:r>
-            <a:r>
-              <a:rPr lang="en-US" baseline="0" dirty="0" smtClean="0"/>
-              <a:t> the exception type being thrown is of type </a:t>
-            </a:r>
-            <a:r>
-              <a:rPr lang="en-US" baseline="0" dirty="0" err="1" smtClean="0"/>
-              <a:t>SQLiteException</a:t>
-            </a:r>
-            <a:r>
-              <a:rPr lang="en-US" baseline="0" dirty="0" smtClean="0"/>
-              <a:t> and not </a:t>
-            </a:r>
-            <a:r>
-              <a:rPr lang="en-US" baseline="0" dirty="0" err="1" smtClean="0"/>
-              <a:t>DapperSqlException</a:t>
-            </a:r>
-            <a:r>
-              <a:rPr lang="en-US" baseline="0" dirty="0" smtClean="0"/>
-              <a:t> or anything like that</a:t>
-            </a:r>
-          </a:p>
-          <a:p>
             <a:endParaRPr lang="en-US" dirty="0"/>
           </a:p>
         </p:txBody>
@@ -3959,7 +3944,7 @@
     </p:spTree>
     <p:extLst>
       <p:ext uri="{BB962C8B-B14F-4D97-AF65-F5344CB8AC3E}">
-        <p14:creationId xmlns:p14="http://schemas.microsoft.com/office/powerpoint/2010/main" val="565194784"/>
+        <p14:creationId xmlns:p14="http://schemas.microsoft.com/office/powerpoint/2010/main" val="3384602555"/>
       </p:ext>
     </p:extLst>
   </p:cSld>
@@ -4136,6 +4121,411 @@
         </p:nvSpPr>
         <p:spPr/>
         <p:txBody>
+          <a:bodyPr/>
+          <a:lstStyle/>
+          <a:p>
+            <a:r>
+              <a:rPr lang="en-US" dirty="0" smtClean="0"/>
+              <a:t>Multi is of type </a:t>
+            </a:r>
+            <a:r>
+              <a:rPr lang="en-US" dirty="0" err="1" smtClean="0"/>
+              <a:t>GridReader</a:t>
+            </a:r>
+            <a:endParaRPr lang="en-US" dirty="0" smtClean="0"/>
+          </a:p>
+          <a:p>
+            <a:endParaRPr lang="en-US" dirty="0"/>
+          </a:p>
+        </p:txBody>
+      </p:sp>
+      <p:sp>
+        <p:nvSpPr>
+          <p:cNvPr id="4" name="Slide Number Placeholder 3"/>
+          <p:cNvSpPr>
+            <a:spLocks noGrp="1"/>
+          </p:cNvSpPr>
+          <p:nvPr>
+            <p:ph type="sldNum" sz="quarter" idx="10"/>
+          </p:nvPr>
+        </p:nvSpPr>
+        <p:spPr/>
+        <p:txBody>
+          <a:bodyPr/>
+          <a:lstStyle/>
+          <a:p>
+            <a:fld id="{E965A807-E819-4112-A5DE-316C1A791510}" type="slidenum">
+              <a:rPr lang="en-US" smtClean="0"/>
+              <a:t>45</a:t>
+            </a:fld>
+            <a:endParaRPr lang="en-US"/>
+          </a:p>
+        </p:txBody>
+      </p:sp>
+    </p:spTree>
+    <p:extLst>
+      <p:ext uri="{BB962C8B-B14F-4D97-AF65-F5344CB8AC3E}">
+        <p14:creationId xmlns:p14="http://schemas.microsoft.com/office/powerpoint/2010/main" val="1542889149"/>
+      </p:ext>
+    </p:extLst>
+  </p:cSld>
+  <p:clrMapOvr>
+    <a:masterClrMapping/>
+  </p:clrMapOvr>
+</p:notes>
+</file>
+
+<file path=ppt/notesSlides/notesSlide41.xml><?xml version="1.0" encoding="utf-8"?>
+<p:notes xmlns:a="http://schemas.openxmlformats.org/drawingml/2006/main" xmlns:r="http://schemas.openxmlformats.org/officeDocument/2006/relationships" xmlns:p="http://schemas.openxmlformats.org/presentationml/2006/main">
+  <p:cSld>
+    <p:spTree>
+      <p:nvGrpSpPr>
+        <p:cNvPr id="1" name=""/>
+        <p:cNvGrpSpPr/>
+        <p:nvPr/>
+      </p:nvGrpSpPr>
+      <p:grpSpPr>
+        <a:xfrm>
+          <a:off x="0" y="0"/>
+          <a:ext cx="0" cy="0"/>
+          <a:chOff x="0" y="0"/>
+          <a:chExt cx="0" cy="0"/>
+        </a:xfrm>
+      </p:grpSpPr>
+      <p:sp>
+        <p:nvSpPr>
+          <p:cNvPr id="2" name="Slide Image Placeholder 1"/>
+          <p:cNvSpPr>
+            <a:spLocks noGrp="1" noRot="1" noChangeAspect="1"/>
+          </p:cNvSpPr>
+          <p:nvPr>
+            <p:ph type="sldImg"/>
+          </p:nvPr>
+        </p:nvSpPr>
+        <p:spPr/>
+      </p:sp>
+      <p:sp>
+        <p:nvSpPr>
+          <p:cNvPr id="3" name="Notes Placeholder 2"/>
+          <p:cNvSpPr>
+            <a:spLocks noGrp="1"/>
+          </p:cNvSpPr>
+          <p:nvPr>
+            <p:ph type="body" idx="1"/>
+          </p:nvPr>
+        </p:nvSpPr>
+        <p:spPr/>
+        <p:txBody>
+          <a:bodyPr/>
+          <a:lstStyle/>
+          <a:p>
+            <a:r>
+              <a:rPr lang="en-US" dirty="0" smtClean="0"/>
+              <a:t>My test used Read,</a:t>
+            </a:r>
+            <a:r>
+              <a:rPr lang="en-US" baseline="0" dirty="0" smtClean="0"/>
+              <a:t> which returns dynamic, but you can use strong typing and </a:t>
+            </a:r>
+            <a:r>
+              <a:rPr lang="en-US" baseline="0" dirty="0" err="1" smtClean="0"/>
+              <a:t>async</a:t>
+            </a:r>
+            <a:r>
+              <a:rPr lang="en-US" baseline="0" dirty="0" smtClean="0"/>
+              <a:t> just like everywhere else</a:t>
+            </a:r>
+            <a:endParaRPr lang="en-US" dirty="0"/>
+          </a:p>
+        </p:txBody>
+      </p:sp>
+      <p:sp>
+        <p:nvSpPr>
+          <p:cNvPr id="4" name="Slide Number Placeholder 3"/>
+          <p:cNvSpPr>
+            <a:spLocks noGrp="1"/>
+          </p:cNvSpPr>
+          <p:nvPr>
+            <p:ph type="sldNum" sz="quarter" idx="10"/>
+          </p:nvPr>
+        </p:nvSpPr>
+        <p:spPr/>
+        <p:txBody>
+          <a:bodyPr/>
+          <a:lstStyle/>
+          <a:p>
+            <a:fld id="{E965A807-E819-4112-A5DE-316C1A791510}" type="slidenum">
+              <a:rPr lang="en-US" smtClean="0"/>
+              <a:t>46</a:t>
+            </a:fld>
+            <a:endParaRPr lang="en-US"/>
+          </a:p>
+        </p:txBody>
+      </p:sp>
+    </p:spTree>
+    <p:extLst>
+      <p:ext uri="{BB962C8B-B14F-4D97-AF65-F5344CB8AC3E}">
+        <p14:creationId xmlns:p14="http://schemas.microsoft.com/office/powerpoint/2010/main" val="4055477433"/>
+      </p:ext>
+    </p:extLst>
+  </p:cSld>
+  <p:clrMapOvr>
+    <a:masterClrMapping/>
+  </p:clrMapOvr>
+</p:notes>
+</file>
+
+<file path=ppt/notesSlides/notesSlide42.xml><?xml version="1.0" encoding="utf-8"?>
+<p:notes xmlns:a="http://schemas.openxmlformats.org/drawingml/2006/main" xmlns:r="http://schemas.openxmlformats.org/officeDocument/2006/relationships" xmlns:p="http://schemas.openxmlformats.org/presentationml/2006/main">
+  <p:cSld>
+    <p:spTree>
+      <p:nvGrpSpPr>
+        <p:cNvPr id="1" name=""/>
+        <p:cNvGrpSpPr/>
+        <p:nvPr/>
+      </p:nvGrpSpPr>
+      <p:grpSpPr>
+        <a:xfrm>
+          <a:off x="0" y="0"/>
+          <a:ext cx="0" cy="0"/>
+          <a:chOff x="0" y="0"/>
+          <a:chExt cx="0" cy="0"/>
+        </a:xfrm>
+      </p:grpSpPr>
+      <p:sp>
+        <p:nvSpPr>
+          <p:cNvPr id="2" name="Slide Image Placeholder 1"/>
+          <p:cNvSpPr>
+            <a:spLocks noGrp="1" noRot="1" noChangeAspect="1"/>
+          </p:cNvSpPr>
+          <p:nvPr>
+            <p:ph type="sldImg"/>
+          </p:nvPr>
+        </p:nvSpPr>
+        <p:spPr/>
+      </p:sp>
+      <p:sp>
+        <p:nvSpPr>
+          <p:cNvPr id="3" name="Notes Placeholder 2"/>
+          <p:cNvSpPr>
+            <a:spLocks noGrp="1"/>
+          </p:cNvSpPr>
+          <p:nvPr>
+            <p:ph type="body" idx="1"/>
+          </p:nvPr>
+        </p:nvSpPr>
+        <p:spPr/>
+        <p:txBody>
+          <a:bodyPr/>
+          <a:lstStyle/>
+          <a:p>
+            <a:r>
+              <a:rPr lang="en-US" dirty="0" smtClean="0"/>
+              <a:t>There</a:t>
+            </a:r>
+            <a:r>
+              <a:rPr lang="en-US" baseline="0" dirty="0" smtClean="0"/>
+              <a:t> are some exceptions dapper will throw, like with the </a:t>
+            </a:r>
+            <a:r>
+              <a:rPr lang="en-US" baseline="0" dirty="0" err="1" smtClean="0"/>
+              <a:t>multimapping</a:t>
+            </a:r>
+            <a:r>
+              <a:rPr lang="en-US" baseline="0" dirty="0" smtClean="0"/>
+              <a:t>.</a:t>
+            </a:r>
+            <a:endParaRPr lang="en-US" dirty="0"/>
+          </a:p>
+        </p:txBody>
+      </p:sp>
+      <p:sp>
+        <p:nvSpPr>
+          <p:cNvPr id="4" name="Slide Number Placeholder 3"/>
+          <p:cNvSpPr>
+            <a:spLocks noGrp="1"/>
+          </p:cNvSpPr>
+          <p:nvPr>
+            <p:ph type="sldNum" sz="quarter" idx="10"/>
+          </p:nvPr>
+        </p:nvSpPr>
+        <p:spPr/>
+        <p:txBody>
+          <a:bodyPr/>
+          <a:lstStyle/>
+          <a:p>
+            <a:fld id="{E965A807-E819-4112-A5DE-316C1A791510}" type="slidenum">
+              <a:rPr lang="en-US" smtClean="0"/>
+              <a:t>47</a:t>
+            </a:fld>
+            <a:endParaRPr lang="en-US"/>
+          </a:p>
+        </p:txBody>
+      </p:sp>
+    </p:spTree>
+    <p:extLst>
+      <p:ext uri="{BB962C8B-B14F-4D97-AF65-F5344CB8AC3E}">
+        <p14:creationId xmlns:p14="http://schemas.microsoft.com/office/powerpoint/2010/main" val="1048032343"/>
+      </p:ext>
+    </p:extLst>
+  </p:cSld>
+  <p:clrMapOvr>
+    <a:masterClrMapping/>
+  </p:clrMapOvr>
+</p:notes>
+</file>
+
+<file path=ppt/notesSlides/notesSlide43.xml><?xml version="1.0" encoding="utf-8"?>
+<p:notes xmlns:a="http://schemas.openxmlformats.org/drawingml/2006/main" xmlns:r="http://schemas.openxmlformats.org/officeDocument/2006/relationships" xmlns:p="http://schemas.openxmlformats.org/presentationml/2006/main">
+  <p:cSld>
+    <p:spTree>
+      <p:nvGrpSpPr>
+        <p:cNvPr id="1" name=""/>
+        <p:cNvGrpSpPr/>
+        <p:nvPr/>
+      </p:nvGrpSpPr>
+      <p:grpSpPr>
+        <a:xfrm>
+          <a:off x="0" y="0"/>
+          <a:ext cx="0" cy="0"/>
+          <a:chOff x="0" y="0"/>
+          <a:chExt cx="0" cy="0"/>
+        </a:xfrm>
+      </p:grpSpPr>
+      <p:sp>
+        <p:nvSpPr>
+          <p:cNvPr id="2" name="Slide Image Placeholder 1"/>
+          <p:cNvSpPr>
+            <a:spLocks noGrp="1" noRot="1" noChangeAspect="1"/>
+          </p:cNvSpPr>
+          <p:nvPr>
+            <p:ph type="sldImg"/>
+          </p:nvPr>
+        </p:nvSpPr>
+        <p:spPr/>
+      </p:sp>
+      <p:sp>
+        <p:nvSpPr>
+          <p:cNvPr id="3" name="Notes Placeholder 2"/>
+          <p:cNvSpPr>
+            <a:spLocks noGrp="1"/>
+          </p:cNvSpPr>
+          <p:nvPr>
+            <p:ph type="body" idx="1"/>
+          </p:nvPr>
+        </p:nvSpPr>
+        <p:spPr/>
+        <p:txBody>
+          <a:bodyPr/>
+          <a:lstStyle/>
+          <a:p>
+            <a:r>
+              <a:rPr lang="en-US" dirty="0" smtClean="0"/>
+              <a:t>Notice</a:t>
+            </a:r>
+            <a:r>
+              <a:rPr lang="en-US" baseline="0" dirty="0" smtClean="0"/>
+              <a:t> the exception type being thrown is of type </a:t>
+            </a:r>
+            <a:r>
+              <a:rPr lang="en-US" baseline="0" dirty="0" err="1" smtClean="0"/>
+              <a:t>SQLiteException</a:t>
+            </a:r>
+            <a:r>
+              <a:rPr lang="en-US" baseline="0" dirty="0" smtClean="0"/>
+              <a:t> and not </a:t>
+            </a:r>
+            <a:r>
+              <a:rPr lang="en-US" baseline="0" dirty="0" err="1" smtClean="0"/>
+              <a:t>DapperSqlException</a:t>
+            </a:r>
+            <a:r>
+              <a:rPr lang="en-US" baseline="0" dirty="0" smtClean="0"/>
+              <a:t> or anything like that</a:t>
+            </a:r>
+          </a:p>
+          <a:p>
+            <a:endParaRPr lang="en-US" dirty="0"/>
+          </a:p>
+        </p:txBody>
+      </p:sp>
+      <p:sp>
+        <p:nvSpPr>
+          <p:cNvPr id="4" name="Slide Number Placeholder 3"/>
+          <p:cNvSpPr>
+            <a:spLocks noGrp="1"/>
+          </p:cNvSpPr>
+          <p:nvPr>
+            <p:ph type="sldNum" sz="quarter" idx="10"/>
+          </p:nvPr>
+        </p:nvSpPr>
+        <p:spPr/>
+        <p:txBody>
+          <a:bodyPr/>
+          <a:lstStyle/>
+          <a:p>
+            <a:fld id="{E965A807-E819-4112-A5DE-316C1A791510}" type="slidenum">
+              <a:rPr lang="en-US" smtClean="0"/>
+              <a:t>48</a:t>
+            </a:fld>
+            <a:endParaRPr lang="en-US"/>
+          </a:p>
+        </p:txBody>
+      </p:sp>
+    </p:spTree>
+    <p:extLst>
+      <p:ext uri="{BB962C8B-B14F-4D97-AF65-F5344CB8AC3E}">
+        <p14:creationId xmlns:p14="http://schemas.microsoft.com/office/powerpoint/2010/main" val="565194784"/>
+      </p:ext>
+    </p:extLst>
+  </p:cSld>
+  <p:clrMapOvr>
+    <a:masterClrMapping/>
+  </p:clrMapOvr>
+</p:notes>
+</file>
+
+<file path=ppt/notesSlides/notesSlide44.xml><?xml version="1.0" encoding="utf-8"?>
+<p:notes xmlns:a="http://schemas.openxmlformats.org/drawingml/2006/main" xmlns:r="http://schemas.openxmlformats.org/officeDocument/2006/relationships" xmlns:p="http://schemas.openxmlformats.org/presentationml/2006/main">
+  <p:cSld>
+    <p:spTree>
+      <p:nvGrpSpPr>
+        <p:cNvPr id="1" name=""/>
+        <p:cNvGrpSpPr/>
+        <p:nvPr/>
+      </p:nvGrpSpPr>
+      <p:grpSpPr>
+        <a:xfrm>
+          <a:off x="0" y="0"/>
+          <a:ext cx="0" cy="0"/>
+          <a:chOff x="0" y="0"/>
+          <a:chExt cx="0" cy="0"/>
+        </a:xfrm>
+      </p:grpSpPr>
+      <p:sp>
+        <p:nvSpPr>
+          <p:cNvPr id="2" name="Slide Image Placeholder 1"/>
+          <p:cNvSpPr>
+            <a:spLocks noGrp="1" noRot="1" noChangeAspect="1"/>
+          </p:cNvSpPr>
+          <p:nvPr>
+            <p:ph type="sldImg"/>
+          </p:nvPr>
+        </p:nvSpPr>
+        <p:spPr/>
+      </p:sp>
+      <p:sp>
+        <p:nvSpPr>
+          <p:cNvPr id="3" name="Notes Placeholder 2"/>
+          <p:cNvSpPr>
+            <a:spLocks noGrp="1"/>
+          </p:cNvSpPr>
+          <p:nvPr>
+            <p:ph type="body" idx="1"/>
+          </p:nvPr>
+        </p:nvSpPr>
+        <p:spPr/>
+        <p:txBody>
           <a:bodyPr>
             <a:normAutofit/>
           </a:bodyPr>
@@ -4163,7 +4553,7 @@
             <a:fld id="{6F33AF83-5447-435F-97FB-33C5164A801E}" type="slidenum">
               <a:rPr lang="en-US" smtClean="0"/>
               <a:pPr/>
-              <a:t>45</a:t>
+              <a:t>49</a:t>
             </a:fld>
             <a:endParaRPr lang="en-US"/>
           </a:p>
@@ -4593,11 +4983,7 @@
             </a:r>
             <a:r>
               <a:rPr lang="en-US" baseline="0" dirty="0" smtClean="0"/>
-              <a:t> micro OR/M performance will be very close to plain </a:t>
-            </a:r>
-            <a:r>
-              <a:rPr lang="en-US" baseline="0" dirty="0" smtClean="0"/>
-              <a:t>ADO.NET. In my experience, data access is very often the performance bottleneck.</a:t>
+              <a:t> micro OR/M performance will be very close to plain ADO.NET. In my experience, data access is very often the performance bottleneck.</a:t>
             </a:r>
             <a:endParaRPr lang="en-US" dirty="0" smtClean="0"/>
           </a:p>
@@ -4765,11 +5151,7 @@
             </a:r>
             <a:r>
               <a:rPr lang="en-US" baseline="0" dirty="0" smtClean="0"/>
-              <a:t>s they grew, there found places with LINQ-to-SQL was a hindrance, and started to replace with Dapper. Not sure if they are still using any LINQ-to-SQL, but for a time they were running both an OR/M and </a:t>
-            </a:r>
-            <a:r>
-              <a:rPr lang="en-US" baseline="0" dirty="0" smtClean="0"/>
-              <a:t>Dapper</a:t>
+              <a:t>s they grew, there found places with LINQ-to-SQL was a hindrance, and started to replace with Dapper. Not sure if they are still using any LINQ-to-SQL, but for a time they were running both an OR/M and Dapper</a:t>
             </a:r>
           </a:p>
           <a:p>
@@ -4975,7 +5357,7 @@
           <a:p>
             <a:fld id="{C977CA76-54C3-40A9-B899-48D849A88128}" type="datetimeFigureOut">
               <a:rPr lang="en-US" smtClean="0"/>
-              <a:t>4/4/2015</a:t>
+              <a:t>4/24/2015</a:t>
             </a:fld>
             <a:endParaRPr lang="en-US"/>
           </a:p>
@@ -5145,7 +5527,7 @@
           <a:p>
             <a:fld id="{C977CA76-54C3-40A9-B899-48D849A88128}" type="datetimeFigureOut">
               <a:rPr lang="en-US" smtClean="0"/>
-              <a:t>4/4/2015</a:t>
+              <a:t>4/24/2015</a:t>
             </a:fld>
             <a:endParaRPr lang="en-US"/>
           </a:p>
@@ -5325,7 +5707,7 @@
           <a:p>
             <a:fld id="{C977CA76-54C3-40A9-B899-48D849A88128}" type="datetimeFigureOut">
               <a:rPr lang="en-US" smtClean="0"/>
-              <a:t>4/4/2015</a:t>
+              <a:t>4/24/2015</a:t>
             </a:fld>
             <a:endParaRPr lang="en-US"/>
           </a:p>
@@ -5495,7 +5877,7 @@
           <a:p>
             <a:fld id="{C977CA76-54C3-40A9-B899-48D849A88128}" type="datetimeFigureOut">
               <a:rPr lang="en-US" smtClean="0"/>
-              <a:t>4/4/2015</a:t>
+              <a:t>4/24/2015</a:t>
             </a:fld>
             <a:endParaRPr lang="en-US"/>
           </a:p>
@@ -5741,7 +6123,7 @@
           <a:p>
             <a:fld id="{C977CA76-54C3-40A9-B899-48D849A88128}" type="datetimeFigureOut">
               <a:rPr lang="en-US" smtClean="0"/>
-              <a:t>4/4/2015</a:t>
+              <a:t>4/24/2015</a:t>
             </a:fld>
             <a:endParaRPr lang="en-US"/>
           </a:p>
@@ -5973,7 +6355,7 @@
           <a:p>
             <a:fld id="{C977CA76-54C3-40A9-B899-48D849A88128}" type="datetimeFigureOut">
               <a:rPr lang="en-US" smtClean="0"/>
-              <a:t>4/4/2015</a:t>
+              <a:t>4/24/2015</a:t>
             </a:fld>
             <a:endParaRPr lang="en-US"/>
           </a:p>
@@ -6340,7 +6722,7 @@
           <a:p>
             <a:fld id="{C977CA76-54C3-40A9-B899-48D849A88128}" type="datetimeFigureOut">
               <a:rPr lang="en-US" smtClean="0"/>
-              <a:t>4/4/2015</a:t>
+              <a:t>4/24/2015</a:t>
             </a:fld>
             <a:endParaRPr lang="en-US"/>
           </a:p>
@@ -6458,7 +6840,7 @@
           <a:p>
             <a:fld id="{C977CA76-54C3-40A9-B899-48D849A88128}" type="datetimeFigureOut">
               <a:rPr lang="en-US" smtClean="0"/>
-              <a:t>4/4/2015</a:t>
+              <a:t>4/24/2015</a:t>
             </a:fld>
             <a:endParaRPr lang="en-US"/>
           </a:p>
@@ -6553,7 +6935,7 @@
           <a:p>
             <a:fld id="{C977CA76-54C3-40A9-B899-48D849A88128}" type="datetimeFigureOut">
               <a:rPr lang="en-US" smtClean="0"/>
-              <a:t>4/4/2015</a:t>
+              <a:t>4/24/2015</a:t>
             </a:fld>
             <a:endParaRPr lang="en-US"/>
           </a:p>
@@ -6830,7 +7212,7 @@
           <a:p>
             <a:fld id="{C977CA76-54C3-40A9-B899-48D849A88128}" type="datetimeFigureOut">
               <a:rPr lang="en-US" smtClean="0"/>
-              <a:t>4/4/2015</a:t>
+              <a:t>4/24/2015</a:t>
             </a:fld>
             <a:endParaRPr lang="en-US"/>
           </a:p>
@@ -7083,7 +7465,7 @@
           <a:p>
             <a:fld id="{C977CA76-54C3-40A9-B899-48D849A88128}" type="datetimeFigureOut">
               <a:rPr lang="en-US" smtClean="0"/>
-              <a:t>4/4/2015</a:t>
+              <a:t>4/24/2015</a:t>
             </a:fld>
             <a:endParaRPr lang="en-US"/>
           </a:p>
@@ -7296,7 +7678,7 @@
           <a:p>
             <a:fld id="{C977CA76-54C3-40A9-B899-48D849A88128}" type="datetimeFigureOut">
               <a:rPr lang="en-US" smtClean="0"/>
-              <a:t>4/4/2015</a:t>
+              <a:t>4/24/2015</a:t>
             </a:fld>
             <a:endParaRPr lang="en-US"/>
           </a:p>
@@ -7894,11 +8276,7 @@
             </a:r>
             <a:r>
               <a:rPr lang="en-US" dirty="0" smtClean="0"/>
-              <a:t>ll ADO.NET </a:t>
-            </a:r>
-            <a:r>
-              <a:rPr lang="en-US" dirty="0" smtClean="0"/>
-              <a:t>providers</a:t>
+              <a:t>ll ADO.NET providers</a:t>
             </a:r>
           </a:p>
           <a:p>
@@ -7906,7 +8284,6 @@
               <a:rPr lang="en-US" dirty="0" smtClean="0"/>
               <a:t>Fastest</a:t>
             </a:r>
-            <a:endParaRPr lang="en-US" dirty="0" smtClean="0"/>
           </a:p>
           <a:p>
             <a:pPr marL="457200" lvl="1" indent="0">
@@ -7920,7 +8297,6 @@
               <a:rPr lang="en-US" dirty="0" smtClean="0"/>
               <a:t>		</a:t>
             </a:r>
-            <a:endParaRPr lang="en-US" dirty="0" smtClean="0"/>
           </a:p>
           <a:p>
             <a:endParaRPr lang="en-US" dirty="0" smtClean="0"/>
@@ -8530,11 +8906,7 @@
             </a:r>
             <a:r>
               <a:rPr lang="en-US" dirty="0" smtClean="0"/>
-              <a:t> </a:t>
-            </a:r>
-            <a:r>
-              <a:rPr lang="en-US" dirty="0" smtClean="0"/>
-              <a:t>= </a:t>
+              <a:t> = </a:t>
             </a:r>
             <a:r>
               <a:rPr lang="en-US" dirty="0" err="1" smtClean="0"/>
@@ -10485,7 +10857,27 @@
             </a:pPr>
             <a:r>
               <a:rPr lang="en-US" dirty="0" smtClean="0"/>
-              <a:t>So far, Dapper tries to map every field to an object.</a:t>
+              <a:t>Dapper maps </a:t>
+            </a:r>
+            <a:r>
+              <a:rPr lang="en-US" dirty="0" smtClean="0"/>
+              <a:t>every </a:t>
+            </a:r>
+            <a:r>
+              <a:rPr lang="en-US" dirty="0" smtClean="0"/>
+              <a:t>row </a:t>
+            </a:r>
+            <a:r>
+              <a:rPr lang="en-US" dirty="0" smtClean="0"/>
+              <a:t>to </a:t>
+            </a:r>
+            <a:r>
+              <a:rPr lang="en-US" dirty="0" smtClean="0"/>
+              <a:t>one </a:t>
+            </a:r>
+            <a:r>
+              <a:rPr lang="en-US" dirty="0" smtClean="0"/>
+              <a:t>object.</a:t>
             </a:r>
           </a:p>
           <a:p>
@@ -10500,12 +10892,13 @@
             </a:pPr>
             <a:r>
               <a:rPr lang="en-US" dirty="0" smtClean="0"/>
-              <a:t>But, the results of a query can be mapped to multiple, related objects</a:t>
-            </a:r>
-            <a:r>
-              <a:rPr lang="en-US" dirty="0" smtClean="0"/>
-              <a:t>.</a:t>
-            </a:r>
+              <a:t>But, </a:t>
+            </a:r>
+            <a:r>
+              <a:rPr lang="en-US" dirty="0" smtClean="0"/>
+              <a:t>Dapper can also map a row to multiple objects, and relate them.</a:t>
+            </a:r>
+            <a:endParaRPr lang="en-US" dirty="0" smtClean="0"/>
           </a:p>
         </p:txBody>
       </p:sp>
@@ -10556,7 +10949,7 @@
       </p:grpSpPr>
       <p:pic>
         <p:nvPicPr>
-          <p:cNvPr id="4" name="Picture 3"/>
+          <p:cNvPr id="2" name="Picture 1"/>
           <p:cNvPicPr>
             <a:picLocks noChangeAspect="1"/>
           </p:cNvPicPr>
@@ -10570,8 +10963,8 @@
         </p:blipFill>
         <p:spPr>
           <a:xfrm>
-            <a:off x="201235" y="0"/>
-            <a:ext cx="11882175" cy="6858000"/>
+            <a:off x="0" y="852407"/>
+            <a:ext cx="12192000" cy="5000524"/>
           </a:xfrm>
           <a:prstGeom prst="rect">
             <a:avLst/>
@@ -11308,6 +11701,130 @@
           <a:chExt cx="0" cy="0"/>
         </a:xfrm>
       </p:grpSpPr>
+      <p:sp>
+        <p:nvSpPr>
+          <p:cNvPr id="2" name="Title 1"/>
+          <p:cNvSpPr>
+            <a:spLocks noGrp="1"/>
+          </p:cNvSpPr>
+          <p:nvPr>
+            <p:ph type="title"/>
+          </p:nvPr>
+        </p:nvSpPr>
+        <p:spPr/>
+        <p:txBody>
+          <a:bodyPr/>
+          <a:lstStyle/>
+          <a:p>
+            <a:r>
+              <a:rPr lang="en-US" dirty="0" err="1" smtClean="0"/>
+              <a:t>splitOn</a:t>
+            </a:r>
+            <a:endParaRPr lang="en-US" dirty="0"/>
+          </a:p>
+        </p:txBody>
+      </p:sp>
+      <p:sp>
+        <p:nvSpPr>
+          <p:cNvPr id="3" name="Content Placeholder 2"/>
+          <p:cNvSpPr>
+            <a:spLocks noGrp="1"/>
+          </p:cNvSpPr>
+          <p:nvPr>
+            <p:ph idx="1"/>
+          </p:nvPr>
+        </p:nvSpPr>
+        <p:spPr/>
+        <p:txBody>
+          <a:bodyPr/>
+          <a:lstStyle/>
+          <a:p>
+            <a:pPr marL="0" indent="0">
+              <a:buNone/>
+            </a:pPr>
+            <a:r>
+              <a:rPr lang="en-US" dirty="0" smtClean="0"/>
+              <a:t>By default, Dapper returns one object per row.</a:t>
+            </a:r>
+          </a:p>
+          <a:p>
+            <a:pPr marL="0" indent="0">
+              <a:buNone/>
+            </a:pPr>
+            <a:endParaRPr lang="en-US" dirty="0"/>
+          </a:p>
+          <a:p>
+            <a:pPr marL="0" indent="0">
+              <a:buNone/>
+            </a:pPr>
+            <a:r>
+              <a:rPr lang="en-US" dirty="0" smtClean="0"/>
+              <a:t>When using multi-mapping, it splits each row into multiple objects.</a:t>
+            </a:r>
+          </a:p>
+          <a:p>
+            <a:pPr marL="0" indent="0">
+              <a:buNone/>
+            </a:pPr>
+            <a:endParaRPr lang="en-US" dirty="0"/>
+          </a:p>
+          <a:p>
+            <a:pPr marL="0" indent="0">
+              <a:buNone/>
+            </a:pPr>
+            <a:r>
+              <a:rPr lang="en-US" dirty="0" smtClean="0"/>
+              <a:t>By default, it splits on “Id” columns. With </a:t>
+            </a:r>
+            <a:r>
+              <a:rPr lang="en-US" dirty="0" err="1" smtClean="0"/>
+              <a:t>splitOn</a:t>
+            </a:r>
+            <a:r>
+              <a:rPr lang="en-US" dirty="0" smtClean="0"/>
+              <a:t>, you can specify different names.</a:t>
+            </a:r>
+          </a:p>
+        </p:txBody>
+      </p:sp>
+    </p:spTree>
+    <p:extLst>
+      <p:ext uri="{BB962C8B-B14F-4D97-AF65-F5344CB8AC3E}">
+        <p14:creationId xmlns:p14="http://schemas.microsoft.com/office/powerpoint/2010/main" val="1574955212"/>
+      </p:ext>
+    </p:extLst>
+  </p:cSld>
+  <p:clrMapOvr>
+    <a:masterClrMapping/>
+  </p:clrMapOvr>
+</p:sld>
+</file>
+
+<file path=ppt/slides/slide34.xml><?xml version="1.0" encoding="utf-8"?>
+<p:sld xmlns:a="http://schemas.openxmlformats.org/drawingml/2006/main" xmlns:r="http://schemas.openxmlformats.org/officeDocument/2006/relationships" xmlns:p="http://schemas.openxmlformats.org/presentationml/2006/main">
+  <p:cSld>
+    <p:bg>
+      <p:bgPr>
+        <a:solidFill>
+          <a:schemeClr val="tx1"/>
+        </a:solidFill>
+        <a:effectLst/>
+      </p:bgPr>
+    </p:bg>
+    <p:spTree>
+      <p:nvGrpSpPr>
+        <p:cNvPr id="1" name=""/>
+        <p:cNvGrpSpPr/>
+        <p:nvPr/>
+      </p:nvGrpSpPr>
+      <p:grpSpPr>
+        <a:xfrm>
+          <a:off x="0" y="0"/>
+          <a:ext cx="0" cy="0"/>
+          <a:chOff x="0" y="0"/>
+          <a:chExt cx="0" cy="0"/>
+        </a:xfrm>
+      </p:grpSpPr>
       <p:pic>
         <p:nvPicPr>
           <p:cNvPr id="4" name="Picture 3"/>
@@ -11317,7 +11834,185 @@
           <p:nvPr/>
         </p:nvPicPr>
         <p:blipFill>
-          <a:blip r:embed="rId2"/>
+          <a:blip r:embed="rId3"/>
+          <a:stretch>
+            <a:fillRect/>
+          </a:stretch>
+        </p:blipFill>
+        <p:spPr>
+          <a:xfrm>
+            <a:off x="728177" y="0"/>
+            <a:ext cx="10635521" cy="6858000"/>
+          </a:xfrm>
+          <a:prstGeom prst="rect">
+            <a:avLst/>
+          </a:prstGeom>
+        </p:spPr>
+      </p:pic>
+    </p:spTree>
+    <p:extLst>
+      <p:ext uri="{BB962C8B-B14F-4D97-AF65-F5344CB8AC3E}">
+        <p14:creationId xmlns:p14="http://schemas.microsoft.com/office/powerpoint/2010/main" val="4103719824"/>
+      </p:ext>
+    </p:extLst>
+  </p:cSld>
+  <p:clrMapOvr>
+    <a:masterClrMapping/>
+  </p:clrMapOvr>
+</p:sld>
+</file>
+
+<file path=ppt/slides/slide35.xml><?xml version="1.0" encoding="utf-8"?>
+<p:sld xmlns:a="http://schemas.openxmlformats.org/drawingml/2006/main" xmlns:r="http://schemas.openxmlformats.org/officeDocument/2006/relationships" xmlns:p="http://schemas.openxmlformats.org/presentationml/2006/main">
+  <p:cSld>
+    <p:bg>
+      <p:bgPr>
+        <a:solidFill>
+          <a:schemeClr val="tx1"/>
+        </a:solidFill>
+        <a:effectLst/>
+      </p:bgPr>
+    </p:bg>
+    <p:spTree>
+      <p:nvGrpSpPr>
+        <p:cNvPr id="1" name=""/>
+        <p:cNvGrpSpPr/>
+        <p:nvPr/>
+      </p:nvGrpSpPr>
+      <p:grpSpPr>
+        <a:xfrm>
+          <a:off x="0" y="0"/>
+          <a:ext cx="0" cy="0"/>
+          <a:chOff x="0" y="0"/>
+          <a:chExt cx="0" cy="0"/>
+        </a:xfrm>
+      </p:grpSpPr>
+      <p:pic>
+        <p:nvPicPr>
+          <p:cNvPr id="4" name="Picture 3"/>
+          <p:cNvPicPr>
+            <a:picLocks noChangeAspect="1"/>
+          </p:cNvPicPr>
+          <p:nvPr/>
+        </p:nvPicPr>
+        <p:blipFill>
+          <a:blip r:embed="rId3"/>
+          <a:stretch>
+            <a:fillRect/>
+          </a:stretch>
+        </p:blipFill>
+        <p:spPr>
+          <a:xfrm>
+            <a:off x="438335" y="0"/>
+            <a:ext cx="11320004" cy="6858000"/>
+          </a:xfrm>
+          <a:prstGeom prst="rect">
+            <a:avLst/>
+          </a:prstGeom>
+        </p:spPr>
+      </p:pic>
+    </p:spTree>
+    <p:extLst>
+      <p:ext uri="{BB962C8B-B14F-4D97-AF65-F5344CB8AC3E}">
+        <p14:creationId xmlns:p14="http://schemas.microsoft.com/office/powerpoint/2010/main" val="1352914507"/>
+      </p:ext>
+    </p:extLst>
+  </p:cSld>
+  <p:clrMapOvr>
+    <a:masterClrMapping/>
+  </p:clrMapOvr>
+</p:sld>
+</file>
+
+<file path=ppt/slides/slide36.xml><?xml version="1.0" encoding="utf-8"?>
+<p:sld xmlns:a="http://schemas.openxmlformats.org/drawingml/2006/main" xmlns:r="http://schemas.openxmlformats.org/officeDocument/2006/relationships" xmlns:p="http://schemas.openxmlformats.org/presentationml/2006/main">
+  <p:cSld>
+    <p:bg>
+      <p:bgPr>
+        <a:solidFill>
+          <a:schemeClr val="tx1"/>
+        </a:solidFill>
+        <a:effectLst/>
+      </p:bgPr>
+    </p:bg>
+    <p:spTree>
+      <p:nvGrpSpPr>
+        <p:cNvPr id="1" name=""/>
+        <p:cNvGrpSpPr/>
+        <p:nvPr/>
+      </p:nvGrpSpPr>
+      <p:grpSpPr>
+        <a:xfrm>
+          <a:off x="0" y="0"/>
+          <a:ext cx="0" cy="0"/>
+          <a:chOff x="0" y="0"/>
+          <a:chExt cx="0" cy="0"/>
+        </a:xfrm>
+      </p:grpSpPr>
+      <p:pic>
+        <p:nvPicPr>
+          <p:cNvPr id="4" name="Picture 3"/>
+          <p:cNvPicPr>
+            <a:picLocks noChangeAspect="1"/>
+          </p:cNvPicPr>
+          <p:nvPr/>
+        </p:nvPicPr>
+        <p:blipFill>
+          <a:blip r:embed="rId3"/>
+          <a:stretch>
+            <a:fillRect/>
+          </a:stretch>
+        </p:blipFill>
+        <p:spPr>
+          <a:xfrm>
+            <a:off x="0" y="542441"/>
+            <a:ext cx="12204712" cy="5672380"/>
+          </a:xfrm>
+          <a:prstGeom prst="rect">
+            <a:avLst/>
+          </a:prstGeom>
+        </p:spPr>
+      </p:pic>
+    </p:spTree>
+    <p:extLst>
+      <p:ext uri="{BB962C8B-B14F-4D97-AF65-F5344CB8AC3E}">
+        <p14:creationId xmlns:p14="http://schemas.microsoft.com/office/powerpoint/2010/main" val="3126264633"/>
+      </p:ext>
+    </p:extLst>
+  </p:cSld>
+  <p:clrMapOvr>
+    <a:masterClrMapping/>
+  </p:clrMapOvr>
+</p:sld>
+</file>
+
+<file path=ppt/slides/slide37.xml><?xml version="1.0" encoding="utf-8"?>
+<p:sld xmlns:a="http://schemas.openxmlformats.org/drawingml/2006/main" xmlns:r="http://schemas.openxmlformats.org/officeDocument/2006/relationships" xmlns:p="http://schemas.openxmlformats.org/presentationml/2006/main">
+  <p:cSld>
+    <p:spTree>
+      <p:nvGrpSpPr>
+        <p:cNvPr id="1" name=""/>
+        <p:cNvGrpSpPr/>
+        <p:nvPr/>
+      </p:nvGrpSpPr>
+      <p:grpSpPr>
+        <a:xfrm>
+          <a:off x="0" y="0"/>
+          <a:ext cx="0" cy="0"/>
+          <a:chOff x="0" y="0"/>
+          <a:chExt cx="0" cy="0"/>
+        </a:xfrm>
+      </p:grpSpPr>
+      <p:pic>
+        <p:nvPicPr>
+          <p:cNvPr id="4" name="Picture 3"/>
+          <p:cNvPicPr>
+            <a:picLocks noChangeAspect="1"/>
+          </p:cNvPicPr>
+          <p:nvPr/>
+        </p:nvPicPr>
+        <p:blipFill>
+          <a:blip r:embed="rId3"/>
           <a:stretch>
             <a:fillRect/>
           </a:stretch>
@@ -11772,7 +12467,7 @@
 </p:sld>
 </file>
 
-<file path=ppt/slides/slide34.xml><?xml version="1.0" encoding="utf-8"?>
+<file path=ppt/slides/slide38.xml><?xml version="1.0" encoding="utf-8"?>
 <p:sld xmlns:a="http://schemas.openxmlformats.org/drawingml/2006/main" xmlns:r="http://schemas.openxmlformats.org/officeDocument/2006/relationships" xmlns:p="http://schemas.openxmlformats.org/presentationml/2006/main">
   <p:cSld>
     <p:spTree>
@@ -11834,7 +12529,6 @@
               <a:rPr lang="en-US" dirty="0" smtClean="0"/>
               <a:t>We saw easy 1-to-1 (parent to child) mapping.</a:t>
             </a:r>
-            <a:endParaRPr lang="en-US" dirty="0" smtClean="0"/>
           </a:p>
           <a:p>
             <a:pPr marL="0" indent="0">
@@ -11873,7 +12567,7 @@
 </p:sld>
 </file>
 
-<file path=ppt/slides/slide35.xml><?xml version="1.0" encoding="utf-8"?>
+<file path=ppt/slides/slide39.xml><?xml version="1.0" encoding="utf-8"?>
 <p:sld xmlns:a="http://schemas.openxmlformats.org/drawingml/2006/main" xmlns:r="http://schemas.openxmlformats.org/officeDocument/2006/relationships" xmlns:p="http://schemas.openxmlformats.org/presentationml/2006/main">
   <p:cSld>
     <p:spTree>
@@ -11934,7 +12628,112 @@
 </p:sld>
 </file>
 
-<file path=ppt/slides/slide36.xml><?xml version="1.0" encoding="utf-8"?>
+<file path=ppt/slides/slide4.xml><?xml version="1.0" encoding="utf-8"?>
+<p:sld xmlns:a="http://schemas.openxmlformats.org/drawingml/2006/main" xmlns:r="http://schemas.openxmlformats.org/officeDocument/2006/relationships" xmlns:p="http://schemas.openxmlformats.org/presentationml/2006/main">
+  <p:cSld>
+    <p:spTree>
+      <p:nvGrpSpPr>
+        <p:cNvPr id="1" name=""/>
+        <p:cNvGrpSpPr/>
+        <p:nvPr/>
+      </p:nvGrpSpPr>
+      <p:grpSpPr>
+        <a:xfrm>
+          <a:off x="0" y="0"/>
+          <a:ext cx="0" cy="0"/>
+          <a:chOff x="0" y="0"/>
+          <a:chExt cx="0" cy="0"/>
+        </a:xfrm>
+      </p:grpSpPr>
+      <p:sp>
+        <p:nvSpPr>
+          <p:cNvPr id="2" name="Title 1"/>
+          <p:cNvSpPr>
+            <a:spLocks noGrp="1"/>
+          </p:cNvSpPr>
+          <p:nvPr>
+            <p:ph type="title"/>
+          </p:nvPr>
+        </p:nvSpPr>
+        <p:spPr/>
+        <p:txBody>
+          <a:bodyPr/>
+          <a:lstStyle/>
+          <a:p>
+            <a:r>
+              <a:rPr lang="en-US" b="1" dirty="0" smtClean="0"/>
+              <a:t>Don’t</a:t>
+            </a:r>
+            <a:r>
+              <a:rPr lang="en-US" dirty="0" smtClean="0"/>
+              <a:t> switch to Dapper</a:t>
+            </a:r>
+            <a:endParaRPr lang="en-US" dirty="0"/>
+          </a:p>
+        </p:txBody>
+      </p:sp>
+      <p:sp>
+        <p:nvSpPr>
+          <p:cNvPr id="3" name="Content Placeholder 2"/>
+          <p:cNvSpPr>
+            <a:spLocks noGrp="1"/>
+          </p:cNvSpPr>
+          <p:nvPr>
+            <p:ph idx="1"/>
+          </p:nvPr>
+        </p:nvSpPr>
+        <p:spPr/>
+        <p:txBody>
+          <a:bodyPr/>
+          <a:lstStyle/>
+          <a:p>
+            <a:r>
+              <a:rPr lang="en-US" dirty="0" smtClean="0"/>
+              <a:t>There are others!</a:t>
+            </a:r>
+          </a:p>
+          <a:p>
+            <a:r>
+              <a:rPr lang="en-US" dirty="0" smtClean="0"/>
+              <a:t>Check out </a:t>
+            </a:r>
+            <a:r>
+              <a:rPr lang="en-US" dirty="0" err="1" smtClean="0"/>
+              <a:t>PetaPoco</a:t>
+            </a:r>
+            <a:r>
+              <a:rPr lang="en-US" dirty="0" smtClean="0"/>
+              <a:t>, Massive, </a:t>
+            </a:r>
+            <a:r>
+              <a:rPr lang="en-US" dirty="0" err="1" smtClean="0"/>
+              <a:t>Simple.Data</a:t>
+            </a:r>
+            <a:endParaRPr lang="en-US" dirty="0"/>
+          </a:p>
+        </p:txBody>
+      </p:sp>
+    </p:spTree>
+    <p:extLst>
+      <p:ext uri="{BB962C8B-B14F-4D97-AF65-F5344CB8AC3E}">
+        <p14:creationId xmlns:p14="http://schemas.microsoft.com/office/powerpoint/2010/main" val="3660519441"/>
+      </p:ext>
+    </p:extLst>
+  </p:cSld>
+  <p:clrMapOvr>
+    <a:masterClrMapping/>
+  </p:clrMapOvr>
+  <p:timing>
+    <p:tnLst>
+      <p:par>
+        <p:cTn id="1" dur="indefinite" restart="never" nodeType="tmRoot"/>
+      </p:par>
+    </p:tnLst>
+  </p:timing>
+</p:sld>
+</file>
+
+<file path=ppt/slides/slide40.xml><?xml version="1.0" encoding="utf-8"?>
 <p:sld xmlns:a="http://schemas.openxmlformats.org/drawingml/2006/main" xmlns:r="http://schemas.openxmlformats.org/officeDocument/2006/relationships" xmlns:p="http://schemas.openxmlformats.org/presentationml/2006/main">
   <p:cSld>
     <p:bg>
@@ -12020,7 +12819,7 @@
 </p:sld>
 </file>
 
-<file path=ppt/slides/slide37.xml><?xml version="1.0" encoding="utf-8"?>
+<file path=ppt/slides/slide41.xml><?xml version="1.0" encoding="utf-8"?>
 <p:sld xmlns:a="http://schemas.openxmlformats.org/drawingml/2006/main" xmlns:r="http://schemas.openxmlformats.org/officeDocument/2006/relationships" xmlns:p="http://schemas.openxmlformats.org/presentationml/2006/main">
   <p:cSld>
     <p:bg>
@@ -12089,7 +12888,7 @@
 </p:sld>
 </file>
 
-<file path=ppt/slides/slide38.xml><?xml version="1.0" encoding="utf-8"?>
+<file path=ppt/slides/slide42.xml><?xml version="1.0" encoding="utf-8"?>
 <p:sld xmlns:a="http://schemas.openxmlformats.org/drawingml/2006/main" xmlns:r="http://schemas.openxmlformats.org/officeDocument/2006/relationships" xmlns:p="http://schemas.openxmlformats.org/presentationml/2006/main">
   <p:cSld>
     <p:bg>
@@ -12158,7 +12957,7 @@
 </p:sld>
 </file>
 
-<file path=ppt/slides/slide39.xml><?xml version="1.0" encoding="utf-8"?>
+<file path=ppt/slides/slide43.xml><?xml version="1.0" encoding="utf-8"?>
 <p:sld xmlns:a="http://schemas.openxmlformats.org/drawingml/2006/main" xmlns:r="http://schemas.openxmlformats.org/officeDocument/2006/relationships" xmlns:p="http://schemas.openxmlformats.org/presentationml/2006/main">
   <p:cSld>
     <p:bg>
@@ -12710,112 +13509,7 @@
 </p:sld>
 </file>
 
-<file path=ppt/slides/slide4.xml><?xml version="1.0" encoding="utf-8"?>
-<p:sld xmlns:a="http://schemas.openxmlformats.org/drawingml/2006/main" xmlns:r="http://schemas.openxmlformats.org/officeDocument/2006/relationships" xmlns:p="http://schemas.openxmlformats.org/presentationml/2006/main">
-  <p:cSld>
-    <p:spTree>
-      <p:nvGrpSpPr>
-        <p:cNvPr id="1" name=""/>
-        <p:cNvGrpSpPr/>
-        <p:nvPr/>
-      </p:nvGrpSpPr>
-      <p:grpSpPr>
-        <a:xfrm>
-          <a:off x="0" y="0"/>
-          <a:ext cx="0" cy="0"/>
-          <a:chOff x="0" y="0"/>
-          <a:chExt cx="0" cy="0"/>
-        </a:xfrm>
-      </p:grpSpPr>
-      <p:sp>
-        <p:nvSpPr>
-          <p:cNvPr id="2" name="Title 1"/>
-          <p:cNvSpPr>
-            <a:spLocks noGrp="1"/>
-          </p:cNvSpPr>
-          <p:nvPr>
-            <p:ph type="title"/>
-          </p:nvPr>
-        </p:nvSpPr>
-        <p:spPr/>
-        <p:txBody>
-          <a:bodyPr/>
-          <a:lstStyle/>
-          <a:p>
-            <a:r>
-              <a:rPr lang="en-US" b="1" dirty="0" smtClean="0"/>
-              <a:t>Don’t</a:t>
-            </a:r>
-            <a:r>
-              <a:rPr lang="en-US" dirty="0" smtClean="0"/>
-              <a:t> switch to Dapper</a:t>
-            </a:r>
-            <a:endParaRPr lang="en-US" dirty="0"/>
-          </a:p>
-        </p:txBody>
-      </p:sp>
-      <p:sp>
-        <p:nvSpPr>
-          <p:cNvPr id="3" name="Content Placeholder 2"/>
-          <p:cNvSpPr>
-            <a:spLocks noGrp="1"/>
-          </p:cNvSpPr>
-          <p:nvPr>
-            <p:ph idx="1"/>
-          </p:nvPr>
-        </p:nvSpPr>
-        <p:spPr/>
-        <p:txBody>
-          <a:bodyPr/>
-          <a:lstStyle/>
-          <a:p>
-            <a:r>
-              <a:rPr lang="en-US" dirty="0" smtClean="0"/>
-              <a:t>There are others!</a:t>
-            </a:r>
-          </a:p>
-          <a:p>
-            <a:r>
-              <a:rPr lang="en-US" dirty="0" smtClean="0"/>
-              <a:t>Check out </a:t>
-            </a:r>
-            <a:r>
-              <a:rPr lang="en-US" dirty="0" err="1" smtClean="0"/>
-              <a:t>PetaPoco</a:t>
-            </a:r>
-            <a:r>
-              <a:rPr lang="en-US" dirty="0" smtClean="0"/>
-              <a:t>, Massive, </a:t>
-            </a:r>
-            <a:r>
-              <a:rPr lang="en-US" dirty="0" err="1" smtClean="0"/>
-              <a:t>Simple.Data</a:t>
-            </a:r>
-            <a:endParaRPr lang="en-US" dirty="0"/>
-          </a:p>
-        </p:txBody>
-      </p:sp>
-    </p:spTree>
-    <p:extLst>
-      <p:ext uri="{BB962C8B-B14F-4D97-AF65-F5344CB8AC3E}">
-        <p14:creationId xmlns:p14="http://schemas.microsoft.com/office/powerpoint/2010/main" val="3660519441"/>
-      </p:ext>
-    </p:extLst>
-  </p:cSld>
-  <p:clrMapOvr>
-    <a:masterClrMapping/>
-  </p:clrMapOvr>
-  <p:timing>
-    <p:tnLst>
-      <p:par>
-        <p:cTn id="1" dur="indefinite" restart="never" nodeType="tmRoot"/>
-      </p:par>
-    </p:tnLst>
-  </p:timing>
-</p:sld>
-</file>
-
-<file path=ppt/slides/slide40.xml><?xml version="1.0" encoding="utf-8"?>
+<file path=ppt/slides/slide44.xml><?xml version="1.0" encoding="utf-8"?>
 <p:sld xmlns:a="http://schemas.openxmlformats.org/drawingml/2006/main" xmlns:r="http://schemas.openxmlformats.org/officeDocument/2006/relationships" xmlns:p="http://schemas.openxmlformats.org/presentationml/2006/main">
   <p:cSld>
     <p:spTree>
@@ -12900,7 +13594,7 @@
 </p:sld>
 </file>
 
-<file path=ppt/slides/slide41.xml><?xml version="1.0" encoding="utf-8"?>
+<file path=ppt/slides/slide45.xml><?xml version="1.0" encoding="utf-8"?>
 <p:sld xmlns:a="http://schemas.openxmlformats.org/drawingml/2006/main" xmlns:r="http://schemas.openxmlformats.org/officeDocument/2006/relationships" xmlns:p="http://schemas.openxmlformats.org/presentationml/2006/main">
   <p:cSld>
     <p:bg>
@@ -12969,7 +13663,7 @@
 </p:sld>
 </file>
 
-<file path=ppt/slides/slide42.xml><?xml version="1.0" encoding="utf-8"?>
+<file path=ppt/slides/slide46.xml><?xml version="1.0" encoding="utf-8"?>
 <p:sld xmlns:a="http://schemas.openxmlformats.org/drawingml/2006/main" xmlns:r="http://schemas.openxmlformats.org/officeDocument/2006/relationships" xmlns:p="http://schemas.openxmlformats.org/presentationml/2006/main">
   <p:cSld>
     <p:spTree>
@@ -13075,7 +13769,7 @@
 </p:sld>
 </file>
 
-<file path=ppt/slides/slide43.xml><?xml version="1.0" encoding="utf-8"?>
+<file path=ppt/slides/slide47.xml><?xml version="1.0" encoding="utf-8"?>
 <p:sld xmlns:a="http://schemas.openxmlformats.org/drawingml/2006/main" xmlns:r="http://schemas.openxmlformats.org/officeDocument/2006/relationships" xmlns:p="http://schemas.openxmlformats.org/presentationml/2006/main">
   <p:cSld>
     <p:spTree>
@@ -13177,7 +13871,7 @@
 </p:sld>
 </file>
 
-<file path=ppt/slides/slide44.xml><?xml version="1.0" encoding="utf-8"?>
+<file path=ppt/slides/slide48.xml><?xml version="1.0" encoding="utf-8"?>
 <p:sld xmlns:a="http://schemas.openxmlformats.org/drawingml/2006/main" xmlns:r="http://schemas.openxmlformats.org/officeDocument/2006/relationships" xmlns:p="http://schemas.openxmlformats.org/presentationml/2006/main">
   <p:cSld>
     <p:bg>
@@ -13246,7 +13940,7 @@
 </p:sld>
 </file>
 
-<file path=ppt/slides/slide45.xml><?xml version="1.0" encoding="utf-8"?>
+<file path=ppt/slides/slide49.xml><?xml version="1.0" encoding="utf-8"?>
 <p:sld xmlns:a="http://schemas.openxmlformats.org/drawingml/2006/main" xmlns:r="http://schemas.openxmlformats.org/officeDocument/2006/relationships" xmlns:p="http://schemas.openxmlformats.org/presentationml/2006/main">
   <p:cSld>
     <p:spTree>

</xml_diff>